<commit_message>
adding the powerpoint again
</commit_message>
<xml_diff>
--- a/Write your first Lightning Web Component.pptx
+++ b/Write your first Lightning Web Component.pptx
@@ -6,7 +6,7 @@
     <p:sldMasterId id="2147483660" r:id="rId2"/>
   </p:sldMasterIdLst>
   <p:notesMasterIdLst>
-    <p:notesMasterId r:id="rId16"/>
+    <p:notesMasterId r:id="rId17"/>
   </p:notesMasterIdLst>
   <p:sldIdLst>
     <p:sldId id="256" r:id="rId3"/>
@@ -22,6 +22,7 @@
     <p:sldId id="1216" r:id="rId13"/>
     <p:sldId id="1218" r:id="rId14"/>
     <p:sldId id="1217" r:id="rId15"/>
+    <p:sldId id="1222" r:id="rId16"/>
   </p:sldIdLst>
   <p:sldSz cx="12192000" cy="6858000"/>
   <p:notesSz cx="6858000" cy="9144000"/>
@@ -805,6 +806,90 @@
     <p:extLst>
       <p:ext uri="{BB962C8B-B14F-4D97-AF65-F5344CB8AC3E}">
         <p14:creationId xmlns:p14="http://schemas.microsoft.com/office/powerpoint/2010/main" val="374094487"/>
+      </p:ext>
+    </p:extLst>
+  </p:cSld>
+  <p:clrMapOvr>
+    <a:masterClrMapping/>
+  </p:clrMapOvr>
+</p:notes>
+</file>
+
+<file path=ppt/notesSlides/notesSlide13.xml><?xml version="1.0" encoding="utf-8"?>
+<p:notes xmlns:a="http://schemas.openxmlformats.org/drawingml/2006/main" xmlns:r="http://schemas.openxmlformats.org/officeDocument/2006/relationships" xmlns:p="http://schemas.openxmlformats.org/presentationml/2006/main">
+  <p:cSld>
+    <p:spTree>
+      <p:nvGrpSpPr>
+        <p:cNvPr id="1" name=""/>
+        <p:cNvGrpSpPr/>
+        <p:nvPr/>
+      </p:nvGrpSpPr>
+      <p:grpSpPr>
+        <a:xfrm>
+          <a:off x="0" y="0"/>
+          <a:ext cx="0" cy="0"/>
+          <a:chOff x="0" y="0"/>
+          <a:chExt cx="0" cy="0"/>
+        </a:xfrm>
+      </p:grpSpPr>
+      <p:sp>
+        <p:nvSpPr>
+          <p:cNvPr id="2" name="Slide Image Placeholder 1"/>
+          <p:cNvSpPr>
+            <a:spLocks noGrp="1" noRot="1" noChangeAspect="1"/>
+          </p:cNvSpPr>
+          <p:nvPr>
+            <p:ph type="sldImg"/>
+          </p:nvPr>
+        </p:nvSpPr>
+        <p:spPr/>
+      </p:sp>
+      <p:sp>
+        <p:nvSpPr>
+          <p:cNvPr id="3" name="Notes Placeholder 2"/>
+          <p:cNvSpPr>
+            <a:spLocks noGrp="1"/>
+          </p:cNvSpPr>
+          <p:nvPr>
+            <p:ph type="body" idx="1"/>
+          </p:nvPr>
+        </p:nvSpPr>
+        <p:spPr/>
+        <p:txBody>
+          <a:bodyPr/>
+          <a:lstStyle/>
+          <a:p>
+            <a:endParaRPr lang="en-US" dirty="0"/>
+          </a:p>
+        </p:txBody>
+      </p:sp>
+      <p:sp>
+        <p:nvSpPr>
+          <p:cNvPr id="4" name="Slide Number Placeholder 3"/>
+          <p:cNvSpPr>
+            <a:spLocks noGrp="1"/>
+          </p:cNvSpPr>
+          <p:nvPr>
+            <p:ph type="sldNum" sz="quarter" idx="5"/>
+          </p:nvPr>
+        </p:nvSpPr>
+        <p:spPr/>
+        <p:txBody>
+          <a:bodyPr/>
+          <a:lstStyle/>
+          <a:p>
+            <a:fld id="{2FA49F76-E860-8543-86F6-F0FB7E06D701}" type="slidenum">
+              <a:rPr lang="en-US" smtClean="0"/>
+              <a:t>14</a:t>
+            </a:fld>
+            <a:endParaRPr lang="en-US"/>
+          </a:p>
+        </p:txBody>
+      </p:sp>
+    </p:spTree>
+    <p:extLst>
+      <p:ext uri="{BB962C8B-B14F-4D97-AF65-F5344CB8AC3E}">
+        <p14:creationId xmlns:p14="http://schemas.microsoft.com/office/powerpoint/2010/main" val="2599832880"/>
       </p:ext>
     </p:extLst>
   </p:cSld>
@@ -26349,6 +26434,774 @@
             <p:ph type="title"/>
           </p:nvPr>
         </p:nvSpPr>
+        <p:spPr>
+          <a:xfrm>
+            <a:off x="838198" y="295457"/>
+            <a:ext cx="10515600" cy="1325563"/>
+          </a:xfrm>
+        </p:spPr>
+        <p:txBody>
+          <a:bodyPr/>
+          <a:lstStyle/>
+          <a:p>
+            <a:r>
+              <a:rPr lang="en-US" sz="4400" b="1" dirty="0">
+                <a:latin typeface="Arial" panose="020B0604020202020204" pitchFamily="34" charset="0"/>
+                <a:cs typeface="Arial" panose="020B0604020202020204" pitchFamily="34" charset="0"/>
+              </a:rPr>
+              <a:t>Quiz</a:t>
+            </a:r>
+            <a:endParaRPr lang="en-US" dirty="0"/>
+          </a:p>
+        </p:txBody>
+      </p:sp>
+      <p:sp>
+        <p:nvSpPr>
+          <p:cNvPr id="4" name="Content Placeholder 2">
+            <a:extLst>
+              <a:ext uri="{FF2B5EF4-FFF2-40B4-BE49-F238E27FC236}">
+                <a16:creationId xmlns:a16="http://schemas.microsoft.com/office/drawing/2014/main" id="{9D7B29F5-29AA-CBEC-F859-2852ABD3F7DD}"/>
+              </a:ext>
+            </a:extLst>
+          </p:cNvPr>
+          <p:cNvSpPr>
+            <a:spLocks noGrp="1"/>
+          </p:cNvSpPr>
+          <p:nvPr>
+            <p:ph idx="1"/>
+          </p:nvPr>
+        </p:nvSpPr>
+        <p:spPr>
+          <a:xfrm>
+            <a:off x="838199" y="1438139"/>
+            <a:ext cx="9908177" cy="1487942"/>
+          </a:xfrm>
+        </p:spPr>
+        <p:txBody>
+          <a:bodyPr>
+            <a:noAutofit/>
+          </a:bodyPr>
+          <a:lstStyle/>
+          <a:p>
+            <a:pPr marL="0" indent="0">
+              <a:buNone/>
+            </a:pPr>
+            <a:r>
+              <a:rPr lang="en-US" sz="1800" b="1" dirty="0">
+                <a:latin typeface="Calibri" panose="020F0502020204030204" pitchFamily="34" charset="0"/>
+                <a:cs typeface="Calibri" panose="020F0502020204030204" pitchFamily="34" charset="0"/>
+              </a:rPr>
+              <a:t>Question 1: </a:t>
+            </a:r>
+            <a:r>
+              <a:rPr lang="en-US" sz="1800" dirty="0">
+                <a:latin typeface="Calibri" panose="020F0502020204030204" pitchFamily="34" charset="0"/>
+                <a:cs typeface="Calibri" panose="020F0502020204030204" pitchFamily="34" charset="0"/>
+              </a:rPr>
+              <a:t>What are the three main files that make up a Lightning Web Component’s anatomy?</a:t>
+            </a:r>
+          </a:p>
+          <a:p>
+            <a:pPr marL="342900" indent="-342900">
+              <a:buFont typeface="+mj-lt"/>
+              <a:buAutoNum type="alphaLcParenR"/>
+            </a:pPr>
+            <a:r>
+              <a:rPr lang="en-US" sz="1600" dirty="0" err="1">
+                <a:latin typeface="Calibri" panose="020F0502020204030204" pitchFamily="34" charset="0"/>
+                <a:cs typeface="Calibri" panose="020F0502020204030204" pitchFamily="34" charset="0"/>
+              </a:rPr>
+              <a:t>Component.js</a:t>
+            </a:r>
+            <a:r>
+              <a:rPr lang="en-US" sz="1600" dirty="0">
+                <a:latin typeface="Calibri" panose="020F0502020204030204" pitchFamily="34" charset="0"/>
+                <a:cs typeface="Calibri" panose="020F0502020204030204" pitchFamily="34" charset="0"/>
+              </a:rPr>
+              <a:t>, </a:t>
+            </a:r>
+            <a:r>
+              <a:rPr lang="en-US" sz="1600" dirty="0" err="1">
+                <a:latin typeface="Calibri" panose="020F0502020204030204" pitchFamily="34" charset="0"/>
+                <a:cs typeface="Calibri" panose="020F0502020204030204" pitchFamily="34" charset="0"/>
+              </a:rPr>
+              <a:t>Component.html</a:t>
+            </a:r>
+            <a:r>
+              <a:rPr lang="en-US" sz="1600" dirty="0">
+                <a:latin typeface="Calibri" panose="020F0502020204030204" pitchFamily="34" charset="0"/>
+                <a:cs typeface="Calibri" panose="020F0502020204030204" pitchFamily="34" charset="0"/>
+              </a:rPr>
+              <a:t>, </a:t>
+            </a:r>
+            <a:r>
+              <a:rPr lang="en-US" sz="1600" dirty="0" err="1">
+                <a:latin typeface="Calibri" panose="020F0502020204030204" pitchFamily="34" charset="0"/>
+                <a:cs typeface="Calibri" panose="020F0502020204030204" pitchFamily="34" charset="0"/>
+              </a:rPr>
+              <a:t>Component.xml</a:t>
+            </a:r>
+            <a:endParaRPr lang="en-US" sz="1600" dirty="0">
+              <a:latin typeface="Calibri" panose="020F0502020204030204" pitchFamily="34" charset="0"/>
+              <a:cs typeface="Calibri" panose="020F0502020204030204" pitchFamily="34" charset="0"/>
+            </a:endParaRPr>
+          </a:p>
+          <a:p>
+            <a:pPr marL="342900" indent="-342900">
+              <a:buFont typeface="+mj-lt"/>
+              <a:buAutoNum type="alphaLcParenR"/>
+            </a:pPr>
+            <a:r>
+              <a:rPr lang="en-US" sz="1600" dirty="0" err="1">
+                <a:latin typeface="Calibri" panose="020F0502020204030204" pitchFamily="34" charset="0"/>
+                <a:cs typeface="Calibri" panose="020F0502020204030204" pitchFamily="34" charset="0"/>
+              </a:rPr>
+              <a:t>Component.js</a:t>
+            </a:r>
+            <a:r>
+              <a:rPr lang="en-US" sz="1600" dirty="0">
+                <a:latin typeface="Calibri" panose="020F0502020204030204" pitchFamily="34" charset="0"/>
+                <a:cs typeface="Calibri" panose="020F0502020204030204" pitchFamily="34" charset="0"/>
+              </a:rPr>
+              <a:t>, </a:t>
+            </a:r>
+            <a:r>
+              <a:rPr lang="en-US" sz="1600" dirty="0" err="1">
+                <a:latin typeface="Calibri" panose="020F0502020204030204" pitchFamily="34" charset="0"/>
+                <a:cs typeface="Calibri" panose="020F0502020204030204" pitchFamily="34" charset="0"/>
+              </a:rPr>
+              <a:t>Component.html</a:t>
+            </a:r>
+            <a:r>
+              <a:rPr lang="en-US" sz="1600" dirty="0">
+                <a:latin typeface="Calibri" panose="020F0502020204030204" pitchFamily="34" charset="0"/>
+                <a:cs typeface="Calibri" panose="020F0502020204030204" pitchFamily="34" charset="0"/>
+              </a:rPr>
+              <a:t>, </a:t>
+            </a:r>
+            <a:r>
+              <a:rPr lang="en-US" sz="1600" dirty="0" err="1">
+                <a:latin typeface="Calibri" panose="020F0502020204030204" pitchFamily="34" charset="0"/>
+                <a:cs typeface="Calibri" panose="020F0502020204030204" pitchFamily="34" charset="0"/>
+              </a:rPr>
+              <a:t>Component.js-meta.xml</a:t>
+            </a:r>
+            <a:endParaRPr lang="en-US" sz="1600" dirty="0">
+              <a:latin typeface="Calibri" panose="020F0502020204030204" pitchFamily="34" charset="0"/>
+              <a:cs typeface="Calibri" panose="020F0502020204030204" pitchFamily="34" charset="0"/>
+            </a:endParaRPr>
+          </a:p>
+          <a:p>
+            <a:pPr marL="342900" indent="-342900">
+              <a:buFont typeface="+mj-lt"/>
+              <a:buAutoNum type="alphaLcParenR"/>
+            </a:pPr>
+            <a:r>
+              <a:rPr lang="en-US" sz="1600" dirty="0" err="1">
+                <a:latin typeface="Calibri" panose="020F0502020204030204" pitchFamily="34" charset="0"/>
+                <a:cs typeface="Calibri" panose="020F0502020204030204" pitchFamily="34" charset="0"/>
+              </a:rPr>
+              <a:t>Component.js</a:t>
+            </a:r>
+            <a:r>
+              <a:rPr lang="en-US" sz="1600" dirty="0">
+                <a:latin typeface="Calibri" panose="020F0502020204030204" pitchFamily="34" charset="0"/>
+                <a:cs typeface="Calibri" panose="020F0502020204030204" pitchFamily="34" charset="0"/>
+              </a:rPr>
+              <a:t>, </a:t>
+            </a:r>
+            <a:r>
+              <a:rPr lang="en-US" sz="1600" dirty="0" err="1">
+                <a:latin typeface="Calibri" panose="020F0502020204030204" pitchFamily="34" charset="0"/>
+                <a:cs typeface="Calibri" panose="020F0502020204030204" pitchFamily="34" charset="0"/>
+              </a:rPr>
+              <a:t>Component.html</a:t>
+            </a:r>
+            <a:r>
+              <a:rPr lang="en-US" sz="1600" dirty="0">
+                <a:latin typeface="Calibri" panose="020F0502020204030204" pitchFamily="34" charset="0"/>
+                <a:cs typeface="Calibri" panose="020F0502020204030204" pitchFamily="34" charset="0"/>
+              </a:rPr>
+              <a:t>, </a:t>
+            </a:r>
+            <a:r>
+              <a:rPr lang="en-US" sz="1600" dirty="0" err="1">
+                <a:latin typeface="Calibri" panose="020F0502020204030204" pitchFamily="34" charset="0"/>
+                <a:cs typeface="Calibri" panose="020F0502020204030204" pitchFamily="34" charset="0"/>
+              </a:rPr>
+              <a:t>Component.css</a:t>
+            </a:r>
+            <a:endParaRPr lang="en-US" sz="1600" dirty="0">
+              <a:latin typeface="Calibri" panose="020F0502020204030204" pitchFamily="34" charset="0"/>
+              <a:cs typeface="Calibri" panose="020F0502020204030204" pitchFamily="34" charset="0"/>
+            </a:endParaRPr>
+          </a:p>
+        </p:txBody>
+      </p:sp>
+      <p:sp>
+        <p:nvSpPr>
+          <p:cNvPr id="5" name="Content Placeholder 2">
+            <a:extLst>
+              <a:ext uri="{FF2B5EF4-FFF2-40B4-BE49-F238E27FC236}">
+                <a16:creationId xmlns:a16="http://schemas.microsoft.com/office/drawing/2014/main" id="{95536615-772F-B22D-EA72-4142B017B45A}"/>
+              </a:ext>
+            </a:extLst>
+          </p:cNvPr>
+          <p:cNvSpPr txBox="1">
+            <a:spLocks/>
+          </p:cNvSpPr>
+          <p:nvPr/>
+        </p:nvSpPr>
+        <p:spPr>
+          <a:xfrm>
+            <a:off x="838198" y="3018744"/>
+            <a:ext cx="9908177" cy="1487942"/>
+          </a:xfrm>
+          <a:prstGeom prst="rect">
+            <a:avLst/>
+          </a:prstGeom>
+        </p:spPr>
+        <p:txBody>
+          <a:bodyPr vert="horz" lIns="91440" tIns="45720" rIns="91440" bIns="45720" rtlCol="0">
+            <a:noAutofit/>
+          </a:bodyPr>
+          <a:lstStyle>
+            <a:lvl1pPr marL="228600" indent="-228600" algn="l" defTabSz="914400" rtl="0" eaLnBrk="1" latinLnBrk="0" hangingPunct="1">
+              <a:lnSpc>
+                <a:spcPct val="90000"/>
+              </a:lnSpc>
+              <a:spcBef>
+                <a:spcPts val="1000"/>
+              </a:spcBef>
+              <a:buFont typeface="Arial" panose="020B0604020202020204" pitchFamily="34" charset="0"/>
+              <a:buChar char="•"/>
+              <a:defRPr sz="2800" kern="1200">
+                <a:solidFill>
+                  <a:schemeClr val="tx1"/>
+                </a:solidFill>
+                <a:latin typeface="+mn-lt"/>
+                <a:ea typeface="+mn-ea"/>
+                <a:cs typeface="+mn-cs"/>
+              </a:defRPr>
+            </a:lvl1pPr>
+            <a:lvl2pPr marL="685800" indent="-228600" algn="l" defTabSz="914400" rtl="0" eaLnBrk="1" latinLnBrk="0" hangingPunct="1">
+              <a:lnSpc>
+                <a:spcPct val="90000"/>
+              </a:lnSpc>
+              <a:spcBef>
+                <a:spcPts val="500"/>
+              </a:spcBef>
+              <a:buFont typeface="Arial" panose="020B0604020202020204" pitchFamily="34" charset="0"/>
+              <a:buChar char="•"/>
+              <a:defRPr sz="2400" kern="1200">
+                <a:solidFill>
+                  <a:schemeClr val="tx1"/>
+                </a:solidFill>
+                <a:latin typeface="+mn-lt"/>
+                <a:ea typeface="+mn-ea"/>
+                <a:cs typeface="+mn-cs"/>
+              </a:defRPr>
+            </a:lvl2pPr>
+            <a:lvl3pPr marL="1143000" indent="-228600" algn="l" defTabSz="914400" rtl="0" eaLnBrk="1" latinLnBrk="0" hangingPunct="1">
+              <a:lnSpc>
+                <a:spcPct val="90000"/>
+              </a:lnSpc>
+              <a:spcBef>
+                <a:spcPts val="500"/>
+              </a:spcBef>
+              <a:buFont typeface="Arial" panose="020B0604020202020204" pitchFamily="34" charset="0"/>
+              <a:buChar char="•"/>
+              <a:defRPr sz="2000" kern="1200">
+                <a:solidFill>
+                  <a:schemeClr val="tx1"/>
+                </a:solidFill>
+                <a:latin typeface="+mn-lt"/>
+                <a:ea typeface="+mn-ea"/>
+                <a:cs typeface="+mn-cs"/>
+              </a:defRPr>
+            </a:lvl3pPr>
+            <a:lvl4pPr marL="1600200" indent="-228600" algn="l" defTabSz="914400" rtl="0" eaLnBrk="1" latinLnBrk="0" hangingPunct="1">
+              <a:lnSpc>
+                <a:spcPct val="90000"/>
+              </a:lnSpc>
+              <a:spcBef>
+                <a:spcPts val="500"/>
+              </a:spcBef>
+              <a:buFont typeface="Arial" panose="020B0604020202020204" pitchFamily="34" charset="0"/>
+              <a:buChar char="•"/>
+              <a:defRPr sz="1800" kern="1200">
+                <a:solidFill>
+                  <a:schemeClr val="tx1"/>
+                </a:solidFill>
+                <a:latin typeface="+mn-lt"/>
+                <a:ea typeface="+mn-ea"/>
+                <a:cs typeface="+mn-cs"/>
+              </a:defRPr>
+            </a:lvl4pPr>
+            <a:lvl5pPr marL="2057400" indent="-228600" algn="l" defTabSz="914400" rtl="0" eaLnBrk="1" latinLnBrk="0" hangingPunct="1">
+              <a:lnSpc>
+                <a:spcPct val="90000"/>
+              </a:lnSpc>
+              <a:spcBef>
+                <a:spcPts val="500"/>
+              </a:spcBef>
+              <a:buFont typeface="Arial" panose="020B0604020202020204" pitchFamily="34" charset="0"/>
+              <a:buChar char="•"/>
+              <a:defRPr sz="1800" kern="1200">
+                <a:solidFill>
+                  <a:schemeClr val="tx1"/>
+                </a:solidFill>
+                <a:latin typeface="+mn-lt"/>
+                <a:ea typeface="+mn-ea"/>
+                <a:cs typeface="+mn-cs"/>
+              </a:defRPr>
+            </a:lvl5pPr>
+            <a:lvl6pPr marL="2514600" indent="-228600" algn="l" defTabSz="914400" rtl="0" eaLnBrk="1" latinLnBrk="0" hangingPunct="1">
+              <a:lnSpc>
+                <a:spcPct val="90000"/>
+              </a:lnSpc>
+              <a:spcBef>
+                <a:spcPts val="500"/>
+              </a:spcBef>
+              <a:buFont typeface="Arial" panose="020B0604020202020204" pitchFamily="34" charset="0"/>
+              <a:buChar char="•"/>
+              <a:defRPr sz="1800" kern="1200">
+                <a:solidFill>
+                  <a:schemeClr val="tx1"/>
+                </a:solidFill>
+                <a:latin typeface="+mn-lt"/>
+                <a:ea typeface="+mn-ea"/>
+                <a:cs typeface="+mn-cs"/>
+              </a:defRPr>
+            </a:lvl6pPr>
+            <a:lvl7pPr marL="2971800" indent="-228600" algn="l" defTabSz="914400" rtl="0" eaLnBrk="1" latinLnBrk="0" hangingPunct="1">
+              <a:lnSpc>
+                <a:spcPct val="90000"/>
+              </a:lnSpc>
+              <a:spcBef>
+                <a:spcPts val="500"/>
+              </a:spcBef>
+              <a:buFont typeface="Arial" panose="020B0604020202020204" pitchFamily="34" charset="0"/>
+              <a:buChar char="•"/>
+              <a:defRPr sz="1800" kern="1200">
+                <a:solidFill>
+                  <a:schemeClr val="tx1"/>
+                </a:solidFill>
+                <a:latin typeface="+mn-lt"/>
+                <a:ea typeface="+mn-ea"/>
+                <a:cs typeface="+mn-cs"/>
+              </a:defRPr>
+            </a:lvl7pPr>
+            <a:lvl8pPr marL="3429000" indent="-228600" algn="l" defTabSz="914400" rtl="0" eaLnBrk="1" latinLnBrk="0" hangingPunct="1">
+              <a:lnSpc>
+                <a:spcPct val="90000"/>
+              </a:lnSpc>
+              <a:spcBef>
+                <a:spcPts val="500"/>
+              </a:spcBef>
+              <a:buFont typeface="Arial" panose="020B0604020202020204" pitchFamily="34" charset="0"/>
+              <a:buChar char="•"/>
+              <a:defRPr sz="1800" kern="1200">
+                <a:solidFill>
+                  <a:schemeClr val="tx1"/>
+                </a:solidFill>
+                <a:latin typeface="+mn-lt"/>
+                <a:ea typeface="+mn-ea"/>
+                <a:cs typeface="+mn-cs"/>
+              </a:defRPr>
+            </a:lvl8pPr>
+            <a:lvl9pPr marL="3886200" indent="-228600" algn="l" defTabSz="914400" rtl="0" eaLnBrk="1" latinLnBrk="0" hangingPunct="1">
+              <a:lnSpc>
+                <a:spcPct val="90000"/>
+              </a:lnSpc>
+              <a:spcBef>
+                <a:spcPts val="500"/>
+              </a:spcBef>
+              <a:buFont typeface="Arial" panose="020B0604020202020204" pitchFamily="34" charset="0"/>
+              <a:buChar char="•"/>
+              <a:defRPr sz="1800" kern="1200">
+                <a:solidFill>
+                  <a:schemeClr val="tx1"/>
+                </a:solidFill>
+                <a:latin typeface="+mn-lt"/>
+                <a:ea typeface="+mn-ea"/>
+                <a:cs typeface="+mn-cs"/>
+              </a:defRPr>
+            </a:lvl9pPr>
+          </a:lstStyle>
+          <a:p>
+            <a:pPr marL="0" indent="0">
+              <a:buFont typeface="Arial" panose="020B0604020202020204" pitchFamily="34" charset="0"/>
+              <a:buNone/>
+            </a:pPr>
+            <a:r>
+              <a:rPr lang="en-US" sz="1800" b="1" dirty="0">
+                <a:latin typeface="Calibri" panose="020F0502020204030204" pitchFamily="34" charset="0"/>
+                <a:cs typeface="Calibri" panose="020F0502020204030204" pitchFamily="34" charset="0"/>
+              </a:rPr>
+              <a:t>Question 2: </a:t>
+            </a:r>
+            <a:r>
+              <a:rPr lang="en-US" sz="1800" dirty="0">
+                <a:latin typeface="Calibri" panose="020F0502020204030204" pitchFamily="34" charset="0"/>
+                <a:cs typeface="Calibri" panose="020F0502020204030204" pitchFamily="34" charset="0"/>
+              </a:rPr>
+              <a:t>In Lightning Web Components, what is the primary purpose of the @</a:t>
+            </a:r>
+            <a:r>
+              <a:rPr lang="en-US" sz="1800" dirty="0" err="1">
+                <a:latin typeface="Calibri" panose="020F0502020204030204" pitchFamily="34" charset="0"/>
+                <a:cs typeface="Calibri" panose="020F0502020204030204" pitchFamily="34" charset="0"/>
+              </a:rPr>
+              <a:t>api</a:t>
+            </a:r>
+            <a:r>
+              <a:rPr lang="en-US" sz="1800" dirty="0">
+                <a:latin typeface="Calibri" panose="020F0502020204030204" pitchFamily="34" charset="0"/>
+                <a:cs typeface="Calibri" panose="020F0502020204030204" pitchFamily="34" charset="0"/>
+              </a:rPr>
+              <a:t> decorator?</a:t>
+            </a:r>
+          </a:p>
+          <a:p>
+            <a:pPr marL="342900" indent="-342900">
+              <a:buFont typeface="+mj-lt"/>
+              <a:buAutoNum type="alphaLcParenR"/>
+            </a:pPr>
+            <a:r>
+              <a:rPr lang="en-US" sz="1600" dirty="0">
+                <a:latin typeface="Calibri" panose="020F0502020204030204" pitchFamily="34" charset="0"/>
+                <a:cs typeface="Calibri" panose="020F0502020204030204" pitchFamily="34" charset="0"/>
+              </a:rPr>
+              <a:t>To make a field reactive</a:t>
+            </a:r>
+          </a:p>
+          <a:p>
+            <a:pPr marL="342900" indent="-342900">
+              <a:buFont typeface="+mj-lt"/>
+              <a:buAutoNum type="alphaLcParenR"/>
+            </a:pPr>
+            <a:r>
+              <a:rPr lang="en-US" sz="1600" dirty="0">
+                <a:latin typeface="Calibri" panose="020F0502020204030204" pitchFamily="34" charset="0"/>
+                <a:cs typeface="Calibri" panose="020F0502020204030204" pitchFamily="34" charset="0"/>
+              </a:rPr>
+              <a:t>To make a property public</a:t>
+            </a:r>
+          </a:p>
+          <a:p>
+            <a:pPr marL="342900" indent="-342900">
+              <a:buFont typeface="+mj-lt"/>
+              <a:buAutoNum type="alphaLcParenR"/>
+            </a:pPr>
+            <a:r>
+              <a:rPr lang="en-US" sz="1600" dirty="0">
+                <a:latin typeface="Calibri" panose="020F0502020204030204" pitchFamily="34" charset="0"/>
+                <a:cs typeface="Calibri" panose="020F0502020204030204" pitchFamily="34" charset="0"/>
+              </a:rPr>
+              <a:t>To wire data from the database</a:t>
+            </a:r>
+          </a:p>
+        </p:txBody>
+      </p:sp>
+      <p:sp>
+        <p:nvSpPr>
+          <p:cNvPr id="7" name="Content Placeholder 2">
+            <a:extLst>
+              <a:ext uri="{FF2B5EF4-FFF2-40B4-BE49-F238E27FC236}">
+                <a16:creationId xmlns:a16="http://schemas.microsoft.com/office/drawing/2014/main" id="{8612C517-D4B2-181F-ACC2-C106F0133D24}"/>
+              </a:ext>
+            </a:extLst>
+          </p:cNvPr>
+          <p:cNvSpPr txBox="1">
+            <a:spLocks/>
+          </p:cNvSpPr>
+          <p:nvPr/>
+        </p:nvSpPr>
+        <p:spPr>
+          <a:xfrm>
+            <a:off x="838198" y="4675890"/>
+            <a:ext cx="9908177" cy="1751036"/>
+          </a:xfrm>
+          <a:prstGeom prst="rect">
+            <a:avLst/>
+          </a:prstGeom>
+        </p:spPr>
+        <p:txBody>
+          <a:bodyPr vert="horz" lIns="91440" tIns="45720" rIns="91440" bIns="45720" rtlCol="0">
+            <a:noAutofit/>
+          </a:bodyPr>
+          <a:lstStyle>
+            <a:lvl1pPr marL="228600" indent="-228600" algn="l" defTabSz="914400" rtl="0" eaLnBrk="1" latinLnBrk="0" hangingPunct="1">
+              <a:lnSpc>
+                <a:spcPct val="90000"/>
+              </a:lnSpc>
+              <a:spcBef>
+                <a:spcPts val="1000"/>
+              </a:spcBef>
+              <a:buFont typeface="Arial" panose="020B0604020202020204" pitchFamily="34" charset="0"/>
+              <a:buChar char="•"/>
+              <a:defRPr sz="2800" kern="1200">
+                <a:solidFill>
+                  <a:schemeClr val="tx1"/>
+                </a:solidFill>
+                <a:latin typeface="+mn-lt"/>
+                <a:ea typeface="+mn-ea"/>
+                <a:cs typeface="+mn-cs"/>
+              </a:defRPr>
+            </a:lvl1pPr>
+            <a:lvl2pPr marL="685800" indent="-228600" algn="l" defTabSz="914400" rtl="0" eaLnBrk="1" latinLnBrk="0" hangingPunct="1">
+              <a:lnSpc>
+                <a:spcPct val="90000"/>
+              </a:lnSpc>
+              <a:spcBef>
+                <a:spcPts val="500"/>
+              </a:spcBef>
+              <a:buFont typeface="Arial" panose="020B0604020202020204" pitchFamily="34" charset="0"/>
+              <a:buChar char="•"/>
+              <a:defRPr sz="2400" kern="1200">
+                <a:solidFill>
+                  <a:schemeClr val="tx1"/>
+                </a:solidFill>
+                <a:latin typeface="+mn-lt"/>
+                <a:ea typeface="+mn-ea"/>
+                <a:cs typeface="+mn-cs"/>
+              </a:defRPr>
+            </a:lvl2pPr>
+            <a:lvl3pPr marL="1143000" indent="-228600" algn="l" defTabSz="914400" rtl="0" eaLnBrk="1" latinLnBrk="0" hangingPunct="1">
+              <a:lnSpc>
+                <a:spcPct val="90000"/>
+              </a:lnSpc>
+              <a:spcBef>
+                <a:spcPts val="500"/>
+              </a:spcBef>
+              <a:buFont typeface="Arial" panose="020B0604020202020204" pitchFamily="34" charset="0"/>
+              <a:buChar char="•"/>
+              <a:defRPr sz="2000" kern="1200">
+                <a:solidFill>
+                  <a:schemeClr val="tx1"/>
+                </a:solidFill>
+                <a:latin typeface="+mn-lt"/>
+                <a:ea typeface="+mn-ea"/>
+                <a:cs typeface="+mn-cs"/>
+              </a:defRPr>
+            </a:lvl3pPr>
+            <a:lvl4pPr marL="1600200" indent="-228600" algn="l" defTabSz="914400" rtl="0" eaLnBrk="1" latinLnBrk="0" hangingPunct="1">
+              <a:lnSpc>
+                <a:spcPct val="90000"/>
+              </a:lnSpc>
+              <a:spcBef>
+                <a:spcPts val="500"/>
+              </a:spcBef>
+              <a:buFont typeface="Arial" panose="020B0604020202020204" pitchFamily="34" charset="0"/>
+              <a:buChar char="•"/>
+              <a:defRPr sz="1800" kern="1200">
+                <a:solidFill>
+                  <a:schemeClr val="tx1"/>
+                </a:solidFill>
+                <a:latin typeface="+mn-lt"/>
+                <a:ea typeface="+mn-ea"/>
+                <a:cs typeface="+mn-cs"/>
+              </a:defRPr>
+            </a:lvl4pPr>
+            <a:lvl5pPr marL="2057400" indent="-228600" algn="l" defTabSz="914400" rtl="0" eaLnBrk="1" latinLnBrk="0" hangingPunct="1">
+              <a:lnSpc>
+                <a:spcPct val="90000"/>
+              </a:lnSpc>
+              <a:spcBef>
+                <a:spcPts val="500"/>
+              </a:spcBef>
+              <a:buFont typeface="Arial" panose="020B0604020202020204" pitchFamily="34" charset="0"/>
+              <a:buChar char="•"/>
+              <a:defRPr sz="1800" kern="1200">
+                <a:solidFill>
+                  <a:schemeClr val="tx1"/>
+                </a:solidFill>
+                <a:latin typeface="+mn-lt"/>
+                <a:ea typeface="+mn-ea"/>
+                <a:cs typeface="+mn-cs"/>
+              </a:defRPr>
+            </a:lvl5pPr>
+            <a:lvl6pPr marL="2514600" indent="-228600" algn="l" defTabSz="914400" rtl="0" eaLnBrk="1" latinLnBrk="0" hangingPunct="1">
+              <a:lnSpc>
+                <a:spcPct val="90000"/>
+              </a:lnSpc>
+              <a:spcBef>
+                <a:spcPts val="500"/>
+              </a:spcBef>
+              <a:buFont typeface="Arial" panose="020B0604020202020204" pitchFamily="34" charset="0"/>
+              <a:buChar char="•"/>
+              <a:defRPr sz="1800" kern="1200">
+                <a:solidFill>
+                  <a:schemeClr val="tx1"/>
+                </a:solidFill>
+                <a:latin typeface="+mn-lt"/>
+                <a:ea typeface="+mn-ea"/>
+                <a:cs typeface="+mn-cs"/>
+              </a:defRPr>
+            </a:lvl6pPr>
+            <a:lvl7pPr marL="2971800" indent="-228600" algn="l" defTabSz="914400" rtl="0" eaLnBrk="1" latinLnBrk="0" hangingPunct="1">
+              <a:lnSpc>
+                <a:spcPct val="90000"/>
+              </a:lnSpc>
+              <a:spcBef>
+                <a:spcPts val="500"/>
+              </a:spcBef>
+              <a:buFont typeface="Arial" panose="020B0604020202020204" pitchFamily="34" charset="0"/>
+              <a:buChar char="•"/>
+              <a:defRPr sz="1800" kern="1200">
+                <a:solidFill>
+                  <a:schemeClr val="tx1"/>
+                </a:solidFill>
+                <a:latin typeface="+mn-lt"/>
+                <a:ea typeface="+mn-ea"/>
+                <a:cs typeface="+mn-cs"/>
+              </a:defRPr>
+            </a:lvl7pPr>
+            <a:lvl8pPr marL="3429000" indent="-228600" algn="l" defTabSz="914400" rtl="0" eaLnBrk="1" latinLnBrk="0" hangingPunct="1">
+              <a:lnSpc>
+                <a:spcPct val="90000"/>
+              </a:lnSpc>
+              <a:spcBef>
+                <a:spcPts val="500"/>
+              </a:spcBef>
+              <a:buFont typeface="Arial" panose="020B0604020202020204" pitchFamily="34" charset="0"/>
+              <a:buChar char="•"/>
+              <a:defRPr sz="1800" kern="1200">
+                <a:solidFill>
+                  <a:schemeClr val="tx1"/>
+                </a:solidFill>
+                <a:latin typeface="+mn-lt"/>
+                <a:ea typeface="+mn-ea"/>
+                <a:cs typeface="+mn-cs"/>
+              </a:defRPr>
+            </a:lvl8pPr>
+            <a:lvl9pPr marL="3886200" indent="-228600" algn="l" defTabSz="914400" rtl="0" eaLnBrk="1" latinLnBrk="0" hangingPunct="1">
+              <a:lnSpc>
+                <a:spcPct val="90000"/>
+              </a:lnSpc>
+              <a:spcBef>
+                <a:spcPts val="500"/>
+              </a:spcBef>
+              <a:buFont typeface="Arial" panose="020B0604020202020204" pitchFamily="34" charset="0"/>
+              <a:buChar char="•"/>
+              <a:defRPr sz="1800" kern="1200">
+                <a:solidFill>
+                  <a:schemeClr val="tx1"/>
+                </a:solidFill>
+                <a:latin typeface="+mn-lt"/>
+                <a:ea typeface="+mn-ea"/>
+                <a:cs typeface="+mn-cs"/>
+              </a:defRPr>
+            </a:lvl9pPr>
+          </a:lstStyle>
+          <a:p>
+            <a:pPr marL="0" indent="0">
+              <a:buFont typeface="Arial" panose="020B0604020202020204" pitchFamily="34" charset="0"/>
+              <a:buNone/>
+            </a:pPr>
+            <a:r>
+              <a:rPr lang="en-US" sz="1800" b="1" dirty="0">
+                <a:latin typeface="Calibri" panose="020F0502020204030204" pitchFamily="34" charset="0"/>
+                <a:cs typeface="Calibri" panose="020F0502020204030204" pitchFamily="34" charset="0"/>
+              </a:rPr>
+              <a:t>Question 3: </a:t>
+            </a:r>
+            <a:r>
+              <a:rPr lang="en-US" sz="1800" dirty="0">
+                <a:latin typeface="Calibri" panose="020F0502020204030204" pitchFamily="34" charset="0"/>
+                <a:cs typeface="Calibri" panose="020F0502020204030204" pitchFamily="34" charset="0"/>
+              </a:rPr>
+              <a:t>Which type of event propagation in LWC allows the event to bubble up through parent components until it reaches the DOM?</a:t>
+            </a:r>
+          </a:p>
+          <a:p>
+            <a:pPr marL="342900" indent="-342900">
+              <a:buFont typeface="+mj-lt"/>
+              <a:buAutoNum type="alphaLcParenR"/>
+            </a:pPr>
+            <a:r>
+              <a:rPr lang="en-US" sz="1600" dirty="0">
+                <a:latin typeface="Calibri" panose="020F0502020204030204" pitchFamily="34" charset="0"/>
+                <a:cs typeface="Calibri" panose="020F0502020204030204" pitchFamily="34" charset="0"/>
+              </a:rPr>
+              <a:t>Capturing events</a:t>
+            </a:r>
+          </a:p>
+          <a:p>
+            <a:pPr marL="342900" indent="-342900">
+              <a:buFont typeface="+mj-lt"/>
+              <a:buAutoNum type="alphaLcParenR"/>
+            </a:pPr>
+            <a:r>
+              <a:rPr lang="en-US" sz="1600" dirty="0">
+                <a:latin typeface="Calibri" panose="020F0502020204030204" pitchFamily="34" charset="0"/>
+                <a:cs typeface="Calibri" panose="020F0502020204030204" pitchFamily="34" charset="0"/>
+              </a:rPr>
+              <a:t>Non-bubbling events</a:t>
+            </a:r>
+          </a:p>
+          <a:p>
+            <a:pPr marL="342900" indent="-342900">
+              <a:buFont typeface="+mj-lt"/>
+              <a:buAutoNum type="alphaLcParenR"/>
+            </a:pPr>
+            <a:r>
+              <a:rPr lang="en-US" sz="1600" dirty="0">
+                <a:latin typeface="Calibri" panose="020F0502020204030204" pitchFamily="34" charset="0"/>
+                <a:cs typeface="Calibri" panose="020F0502020204030204" pitchFamily="34" charset="0"/>
+              </a:rPr>
+              <a:t>Bubbling events</a:t>
+            </a:r>
+          </a:p>
+        </p:txBody>
+      </p:sp>
+    </p:spTree>
+    <p:extLst>
+      <p:ext uri="{BB962C8B-B14F-4D97-AF65-F5344CB8AC3E}">
+        <p14:creationId xmlns:p14="http://schemas.microsoft.com/office/powerpoint/2010/main" val="4054816629"/>
+      </p:ext>
+    </p:extLst>
+  </p:cSld>
+  <p:clrMapOvr>
+    <a:masterClrMapping/>
+  </p:clrMapOvr>
+</p:sld>
+</file>
+
+<file path=ppt/slides/slide14.xml><?xml version="1.0" encoding="utf-8"?>
+<p:sld xmlns:a="http://schemas.openxmlformats.org/drawingml/2006/main" xmlns:r="http://schemas.openxmlformats.org/officeDocument/2006/relationships" xmlns:p="http://schemas.openxmlformats.org/presentationml/2006/main">
+  <p:cSld>
+    <p:spTree>
+      <p:nvGrpSpPr>
+        <p:cNvPr id="1" name=""/>
+        <p:cNvGrpSpPr/>
+        <p:nvPr/>
+      </p:nvGrpSpPr>
+      <p:grpSpPr>
+        <a:xfrm>
+          <a:off x="0" y="0"/>
+          <a:ext cx="0" cy="0"/>
+          <a:chOff x="0" y="0"/>
+          <a:chExt cx="0" cy="0"/>
+        </a:xfrm>
+      </p:grpSpPr>
+      <p:sp>
+        <p:nvSpPr>
+          <p:cNvPr id="2" name="Title 1">
+            <a:extLst>
+              <a:ext uri="{FF2B5EF4-FFF2-40B4-BE49-F238E27FC236}">
+                <a16:creationId xmlns:a16="http://schemas.microsoft.com/office/drawing/2014/main" id="{654D37C2-FAA9-74E2-FCA7-EA1C2C2014A0}"/>
+              </a:ext>
+            </a:extLst>
+          </p:cNvPr>
+          <p:cNvSpPr>
+            <a:spLocks noGrp="1"/>
+          </p:cNvSpPr>
+          <p:nvPr>
+            <p:ph type="title"/>
+          </p:nvPr>
+        </p:nvSpPr>
         <p:spPr/>
         <p:txBody>
           <a:bodyPr/>
@@ -26423,7 +27276,7 @@
     </p:spTree>
     <p:extLst>
       <p:ext uri="{BB962C8B-B14F-4D97-AF65-F5344CB8AC3E}">
-        <p14:creationId xmlns:p14="http://schemas.microsoft.com/office/powerpoint/2010/main" val="4054816629"/>
+        <p14:creationId xmlns:p14="http://schemas.microsoft.com/office/powerpoint/2010/main" val="4009617009"/>
       </p:ext>
     </p:extLst>
   </p:cSld>
@@ -26506,7 +27359,7 @@
         </p:spPr>
         <p:txBody>
           <a:bodyPr>
-            <a:normAutofit lnSpcReduction="10000"/>
+            <a:normAutofit fontScale="92500" lnSpcReduction="20000"/>
           </a:bodyPr>
           <a:lstStyle/>
           <a:p>
@@ -26580,6 +27433,12 @@
             <a:r>
               <a:rPr lang="en-US" sz="2000" dirty="0"/>
               <a:t>Working with Apex</a:t>
+            </a:r>
+          </a:p>
+          <a:p>
+            <a:r>
+              <a:rPr lang="en-US" sz="2400" dirty="0"/>
+              <a:t>Quiz</a:t>
             </a:r>
           </a:p>
           <a:p>

</xml_diff>